<commit_message>
acpt: add scenarios for LineFormat.color
</commit_message>
<xml_diff>
--- a/features/steps/test_files/shp-line-props.pptx
+++ b/features/steps/test_files/shp-line-props.pptx
@@ -6,6 +6,7 @@
   </p:sldMasterIdLst>
   <p:sldIdLst>
     <p:sldId id="256" r:id="rId2"/>
+    <p:sldId id="257" r:id="rId3"/>
   </p:sldIdLst>
   <p:sldSz cx="9144000" cy="6858000" type="screen4x3"/>
   <p:notesSz cx="6858000" cy="9144000"/>
@@ -597,6 +598,208 @@
     <p:extLst>
       <p:ext uri="{BB962C8B-B14F-4D97-AF65-F5344CB8AC3E}">
         <p14:creationId xmlns:p14="http://schemas.microsoft.com/office/powerpoint/2010/main" val="3606822289"/>
+      </p:ext>
+    </p:extLst>
+  </p:cSld>
+  <p:clrMapOvr>
+    <a:masterClrMapping/>
+  </p:clrMapOvr>
+</p:sld>
+</file>
+
+<file path=ppt/slides/slide2.xml><?xml version="1.0" encoding="utf-8"?>
+<p:sld xmlns:a="http://schemas.openxmlformats.org/drawingml/2006/main" xmlns:r="http://schemas.openxmlformats.org/officeDocument/2006/relationships" xmlns:p="http://schemas.openxmlformats.org/presentationml/2006/main">
+  <p:cSld>
+    <p:spTree>
+      <p:nvGrpSpPr>
+        <p:cNvPr id="1" name=""/>
+        <p:cNvGrpSpPr/>
+        <p:nvPr/>
+      </p:nvGrpSpPr>
+      <p:grpSpPr>
+        <a:xfrm>
+          <a:off x="0" y="0"/>
+          <a:ext cx="0" cy="0"/>
+          <a:chOff x="0" y="0"/>
+          <a:chExt cx="0" cy="0"/>
+        </a:xfrm>
+      </p:grpSpPr>
+      <p:sp>
+        <p:nvSpPr>
+          <p:cNvPr id="2" name="Rounded Rectangle 1"/>
+          <p:cNvSpPr/>
+          <p:nvPr/>
+        </p:nvSpPr>
+        <p:spPr>
+          <a:xfrm>
+            <a:off x="914400" y="914400"/>
+            <a:ext cx="914400" cy="914400"/>
+          </a:xfrm>
+          <a:prstGeom prst="roundRect">
+            <a:avLst/>
+          </a:prstGeom>
+        </p:spPr>
+        <p:style>
+          <a:lnRef idx="1">
+            <a:schemeClr val="accent1"/>
+          </a:lnRef>
+          <a:fillRef idx="3">
+            <a:schemeClr val="accent1"/>
+          </a:fillRef>
+          <a:effectRef idx="2">
+            <a:schemeClr val="accent1"/>
+          </a:effectRef>
+          <a:fontRef idx="minor">
+            <a:schemeClr val="lt1"/>
+          </a:fontRef>
+        </p:style>
+        <p:txBody>
+          <a:bodyPr lIns="0" rIns="0" rtlCol="0" anchor="ctr"/>
+          <a:lstStyle/>
+          <a:p>
+            <a:pPr algn="ctr"/>
+            <a:r>
+              <a:rPr lang="en-US" sz="1100" dirty="0" smtClean="0"/>
+              <a:t>No (directly-applied)</a:t>
+            </a:r>
+          </a:p>
+          <a:p>
+            <a:pPr algn="ctr"/>
+            <a:r>
+              <a:rPr lang="en-US" sz="1100" dirty="0" smtClean="0"/>
+              <a:t>Outline Color</a:t>
+            </a:r>
+            <a:endParaRPr lang="en-US" sz="1100" dirty="0"/>
+          </a:p>
+        </p:txBody>
+      </p:sp>
+      <p:sp>
+        <p:nvSpPr>
+          <p:cNvPr id="3" name="Rounded Rectangle 2"/>
+          <p:cNvSpPr/>
+          <p:nvPr/>
+        </p:nvSpPr>
+        <p:spPr>
+          <a:xfrm>
+            <a:off x="4114800" y="2971800"/>
+            <a:ext cx="914400" cy="914400"/>
+          </a:xfrm>
+          <a:prstGeom prst="roundRect">
+            <a:avLst/>
+          </a:prstGeom>
+          <a:solidFill>
+            <a:srgbClr val="FCD5B5"/>
+          </a:solidFill>
+          <a:ln w="57150" cmpd="thickThin">
+            <a:solidFill>
+              <a:srgbClr val="008000"/>
+            </a:solidFill>
+          </a:ln>
+        </p:spPr>
+        <p:style>
+          <a:lnRef idx="1">
+            <a:schemeClr val="accent1"/>
+          </a:lnRef>
+          <a:fillRef idx="3">
+            <a:schemeClr val="accent1"/>
+          </a:fillRef>
+          <a:effectRef idx="2">
+            <a:schemeClr val="accent1"/>
+          </a:effectRef>
+          <a:fontRef idx="minor">
+            <a:schemeClr val="lt1"/>
+          </a:fontRef>
+        </p:style>
+        <p:txBody>
+          <a:bodyPr rtlCol="0" anchor="ctr"/>
+          <a:lstStyle/>
+          <a:p>
+            <a:pPr algn="ctr"/>
+            <a:r>
+              <a:rPr lang="en-US" sz="1200" dirty="0" smtClean="0">
+                <a:solidFill>
+                  <a:schemeClr val="accent1">
+                    <a:lumMod val="75000"/>
+                  </a:schemeClr>
+                </a:solidFill>
+              </a:rPr>
+              <a:t>RGB Outline Color</a:t>
+            </a:r>
+            <a:endParaRPr lang="en-US" sz="1200" dirty="0">
+              <a:solidFill>
+                <a:schemeClr val="accent1">
+                  <a:lumMod val="75000"/>
+                </a:schemeClr>
+              </a:solidFill>
+            </a:endParaRPr>
+          </a:p>
+        </p:txBody>
+      </p:sp>
+      <p:sp>
+        <p:nvSpPr>
+          <p:cNvPr id="4" name="Rounded Rectangle 3"/>
+          <p:cNvSpPr/>
+          <p:nvPr/>
+        </p:nvSpPr>
+        <p:spPr>
+          <a:xfrm>
+            <a:off x="7315200" y="5029200"/>
+            <a:ext cx="914400" cy="914400"/>
+          </a:xfrm>
+          <a:prstGeom prst="roundRect">
+            <a:avLst/>
+          </a:prstGeom>
+          <a:solidFill>
+            <a:schemeClr val="accent3">
+              <a:lumMod val="40000"/>
+              <a:lumOff val="60000"/>
+            </a:schemeClr>
+          </a:solidFill>
+          <a:ln w="28575" cmpd="sng">
+            <a:solidFill>
+              <a:schemeClr val="accent4"/>
+            </a:solidFill>
+          </a:ln>
+        </p:spPr>
+        <p:style>
+          <a:lnRef idx="1">
+            <a:schemeClr val="accent1"/>
+          </a:lnRef>
+          <a:fillRef idx="3">
+            <a:schemeClr val="accent1"/>
+          </a:fillRef>
+          <a:effectRef idx="2">
+            <a:schemeClr val="accent1"/>
+          </a:effectRef>
+          <a:fontRef idx="minor">
+            <a:schemeClr val="lt1"/>
+          </a:fontRef>
+        </p:style>
+        <p:txBody>
+          <a:bodyPr rtlCol="0" anchor="ctr"/>
+          <a:lstStyle/>
+          <a:p>
+            <a:pPr algn="ctr"/>
+            <a:r>
+              <a:rPr lang="en-US" sz="1200" dirty="0" smtClean="0">
+                <a:solidFill>
+                  <a:srgbClr val="FF0000"/>
+                </a:solidFill>
+              </a:rPr>
+              <a:t>Theme Outline Color</a:t>
+            </a:r>
+            <a:endParaRPr lang="en-US" sz="1200" dirty="0">
+              <a:solidFill>
+                <a:srgbClr val="FF0000"/>
+              </a:solidFill>
+            </a:endParaRPr>
+          </a:p>
+        </p:txBody>
+      </p:sp>
+    </p:spTree>
+    <p:extLst>
+      <p:ext uri="{BB962C8B-B14F-4D97-AF65-F5344CB8AC3E}">
+        <p14:creationId xmlns:p14="http://schemas.microsoft.com/office/powerpoint/2010/main" val="3139157598"/>
       </p:ext>
     </p:extLst>
   </p:cSld>

</xml_diff>

<commit_message>
acpt: add scenario for line width
</commit_message>
<xml_diff>
--- a/features/steps/test_files/shp-line-props.pptx
+++ b/features/steps/test_files/shp-line-props.pptx
@@ -7,6 +7,7 @@
   <p:sldIdLst>
     <p:sldId id="256" r:id="rId2"/>
     <p:sldId id="257" r:id="rId3"/>
+    <p:sldId id="258" r:id="rId4"/>
   </p:sldIdLst>
   <p:sldSz cx="9144000" cy="6858000" type="screen4x3"/>
   <p:notesSz cx="6858000" cy="9144000"/>
@@ -800,6 +801,159 @@
     <p:extLst>
       <p:ext uri="{BB962C8B-B14F-4D97-AF65-F5344CB8AC3E}">
         <p14:creationId xmlns:p14="http://schemas.microsoft.com/office/powerpoint/2010/main" val="3139157598"/>
+      </p:ext>
+    </p:extLst>
+  </p:cSld>
+  <p:clrMapOvr>
+    <a:masterClrMapping/>
+  </p:clrMapOvr>
+</p:sld>
+</file>
+
+<file path=ppt/slides/slide3.xml><?xml version="1.0" encoding="utf-8"?>
+<p:sld xmlns:a="http://schemas.openxmlformats.org/drawingml/2006/main" xmlns:r="http://schemas.openxmlformats.org/officeDocument/2006/relationships" xmlns:p="http://schemas.openxmlformats.org/presentationml/2006/main">
+  <p:cSld>
+    <p:spTree>
+      <p:nvGrpSpPr>
+        <p:cNvPr id="1" name=""/>
+        <p:cNvGrpSpPr/>
+        <p:nvPr/>
+      </p:nvGrpSpPr>
+      <p:grpSpPr>
+        <a:xfrm>
+          <a:off x="0" y="0"/>
+          <a:ext cx="0" cy="0"/>
+          <a:chOff x="0" y="0"/>
+          <a:chExt cx="0" cy="0"/>
+        </a:xfrm>
+      </p:grpSpPr>
+      <p:sp>
+        <p:nvSpPr>
+          <p:cNvPr id="5" name="Rounded Rectangle 4"/>
+          <p:cNvSpPr/>
+          <p:nvPr/>
+        </p:nvSpPr>
+        <p:spPr>
+          <a:xfrm>
+            <a:off x="914400" y="914400"/>
+            <a:ext cx="914400" cy="914400"/>
+          </a:xfrm>
+          <a:prstGeom prst="roundRect">
+            <a:avLst/>
+          </a:prstGeom>
+        </p:spPr>
+        <p:style>
+          <a:lnRef idx="1">
+            <a:schemeClr val="accent1"/>
+          </a:lnRef>
+          <a:fillRef idx="3">
+            <a:schemeClr val="accent1"/>
+          </a:fillRef>
+          <a:effectRef idx="2">
+            <a:schemeClr val="accent1"/>
+          </a:effectRef>
+          <a:fontRef idx="minor">
+            <a:schemeClr val="lt1"/>
+          </a:fontRef>
+        </p:style>
+        <p:txBody>
+          <a:bodyPr lIns="0" rIns="0" rtlCol="0" anchor="ctr"/>
+          <a:lstStyle/>
+          <a:p>
+            <a:pPr algn="ctr"/>
+            <a:r>
+              <a:rPr lang="en-US" sz="1200" dirty="0" smtClean="0"/>
+              <a:t>No (directly applied) line width</a:t>
+            </a:r>
+            <a:endParaRPr lang="en-US" sz="1200" dirty="0"/>
+          </a:p>
+        </p:txBody>
+      </p:sp>
+      <p:sp>
+        <p:nvSpPr>
+          <p:cNvPr id="3" name="Rounded Rectangle 2"/>
+          <p:cNvSpPr/>
+          <p:nvPr/>
+        </p:nvSpPr>
+        <p:spPr>
+          <a:xfrm>
+            <a:off x="4114800" y="2971800"/>
+            <a:ext cx="914400" cy="914400"/>
+          </a:xfrm>
+          <a:prstGeom prst="roundRect">
+            <a:avLst/>
+          </a:prstGeom>
+          <a:solidFill>
+            <a:srgbClr val="FCD5B5"/>
+          </a:solidFill>
+          <a:ln w="12700" cmpd="sng">
+            <a:solidFill>
+              <a:srgbClr val="008000"/>
+            </a:solidFill>
+          </a:ln>
+        </p:spPr>
+        <p:style>
+          <a:lnRef idx="1">
+            <a:schemeClr val="accent1"/>
+          </a:lnRef>
+          <a:fillRef idx="3">
+            <a:schemeClr val="accent1"/>
+          </a:fillRef>
+          <a:effectRef idx="2">
+            <a:schemeClr val="accent1"/>
+          </a:effectRef>
+          <a:fontRef idx="minor">
+            <a:schemeClr val="lt1"/>
+          </a:fontRef>
+        </p:style>
+        <p:txBody>
+          <a:bodyPr rtlCol="0" anchor="ctr"/>
+          <a:lstStyle/>
+          <a:p>
+            <a:pPr algn="ctr"/>
+            <a:r>
+              <a:rPr lang="en-US" sz="1200" dirty="0" smtClean="0">
+                <a:solidFill>
+                  <a:schemeClr val="accent1">
+                    <a:lumMod val="75000"/>
+                  </a:schemeClr>
+                </a:solidFill>
+              </a:rPr>
+              <a:t>1 point </a:t>
+            </a:r>
+            <a:br>
+              <a:rPr lang="en-US" sz="1200" dirty="0" smtClean="0">
+                <a:solidFill>
+                  <a:schemeClr val="accent1">
+                    <a:lumMod val="75000"/>
+                  </a:schemeClr>
+                </a:solidFill>
+              </a:rPr>
+            </a:br>
+            <a:r>
+              <a:rPr lang="en-US" sz="1200" dirty="0" smtClean="0">
+                <a:solidFill>
+                  <a:schemeClr val="accent1">
+                    <a:lumMod val="75000"/>
+                  </a:schemeClr>
+                </a:solidFill>
+              </a:rPr>
+              <a:t>line width</a:t>
+            </a:r>
+            <a:endParaRPr lang="en-US" sz="1200" dirty="0">
+              <a:solidFill>
+                <a:schemeClr val="accent1">
+                  <a:lumMod val="75000"/>
+                </a:schemeClr>
+              </a:solidFill>
+            </a:endParaRPr>
+          </a:p>
+        </p:txBody>
+      </p:sp>
+    </p:spTree>
+    <p:extLst>
+      <p:ext uri="{BB962C8B-B14F-4D97-AF65-F5344CB8AC3E}">
+        <p14:creationId xmlns:p14="http://schemas.microsoft.com/office/powerpoint/2010/main" val="2760353493"/>
       </p:ext>
     </p:extLst>
   </p:cSld>

</xml_diff>